<commit_message>
Atualização arquivos usados em aula.
</commit_message>
<xml_diff>
--- a/02_SQL_Engine/Aula_01/01_DIA_01_INTRODUCAO_SQL_MBA_ENGENHARIA_SQL_ENGINES.pptx
+++ b/02_SQL_Engine/Aula_01/01_DIA_01_INTRODUCAO_SQL_MBA_ENGENHARIA_SQL_ENGINES.pptx
@@ -5,7 +5,7 @@
     <p:sldMasterId id="2147483648" r:id="rId1"/>
   </p:sldMasterIdLst>
   <p:notesMasterIdLst>
-    <p:notesMasterId r:id="rId16"/>
+    <p:notesMasterId r:id="rId17"/>
   </p:notesMasterIdLst>
   <p:sldIdLst>
     <p:sldId id="323" r:id="rId2"/>
@@ -22,6 +22,7 @@
     <p:sldId id="326" r:id="rId13"/>
     <p:sldId id="327" r:id="rId14"/>
     <p:sldId id="328" r:id="rId15"/>
+    <p:sldId id="329" r:id="rId16"/>
   </p:sldIdLst>
   <p:sldSz cx="12192000" cy="6858000"/>
   <p:notesSz cx="6858000" cy="9144000"/>
@@ -4941,7 +4942,7 @@
           <a:p>
             <a:fld id="{2101FB92-3B40-4CEB-8EF6-98192792E525}" type="datetimeFigureOut">
               <a:rPr lang="pt-BR" smtClean="0"/>
-              <a:t>03/09/2024</a:t>
+              <a:t>05/09/2024</a:t>
             </a:fld>
             <a:endParaRPr lang="pt-BR"/>
           </a:p>
@@ -5355,7 +5356,7 @@
           <a:p>
             <a:fld id="{13015A94-D9CB-470F-A58C-5F43E2446D83}" type="datetimeFigureOut">
               <a:rPr lang="pt-BR" smtClean="0"/>
-              <a:t>03/09/2024</a:t>
+              <a:t>05/09/2024</a:t>
             </a:fld>
             <a:endParaRPr lang="pt-BR"/>
           </a:p>
@@ -5553,7 +5554,7 @@
           <a:p>
             <a:fld id="{13015A94-D9CB-470F-A58C-5F43E2446D83}" type="datetimeFigureOut">
               <a:rPr lang="pt-BR" smtClean="0"/>
-              <a:t>03/09/2024</a:t>
+              <a:t>05/09/2024</a:t>
             </a:fld>
             <a:endParaRPr lang="pt-BR"/>
           </a:p>
@@ -5761,7 +5762,7 @@
           <a:p>
             <a:fld id="{13015A94-D9CB-470F-A58C-5F43E2446D83}" type="datetimeFigureOut">
               <a:rPr lang="pt-BR" smtClean="0"/>
-              <a:t>03/09/2024</a:t>
+              <a:t>05/09/2024</a:t>
             </a:fld>
             <a:endParaRPr lang="pt-BR"/>
           </a:p>
@@ -5959,7 +5960,7 @@
           <a:p>
             <a:fld id="{13015A94-D9CB-470F-A58C-5F43E2446D83}" type="datetimeFigureOut">
               <a:rPr lang="pt-BR" smtClean="0"/>
-              <a:t>03/09/2024</a:t>
+              <a:t>05/09/2024</a:t>
             </a:fld>
             <a:endParaRPr lang="pt-BR"/>
           </a:p>
@@ -6234,7 +6235,7 @@
           <a:p>
             <a:fld id="{13015A94-D9CB-470F-A58C-5F43E2446D83}" type="datetimeFigureOut">
               <a:rPr lang="pt-BR" smtClean="0"/>
-              <a:t>03/09/2024</a:t>
+              <a:t>05/09/2024</a:t>
             </a:fld>
             <a:endParaRPr lang="pt-BR"/>
           </a:p>
@@ -6499,7 +6500,7 @@
           <a:p>
             <a:fld id="{13015A94-D9CB-470F-A58C-5F43E2446D83}" type="datetimeFigureOut">
               <a:rPr lang="pt-BR" smtClean="0"/>
-              <a:t>03/09/2024</a:t>
+              <a:t>05/09/2024</a:t>
             </a:fld>
             <a:endParaRPr lang="pt-BR"/>
           </a:p>
@@ -6911,7 +6912,7 @@
           <a:p>
             <a:fld id="{13015A94-D9CB-470F-A58C-5F43E2446D83}" type="datetimeFigureOut">
               <a:rPr lang="pt-BR" smtClean="0"/>
-              <a:t>03/09/2024</a:t>
+              <a:t>05/09/2024</a:t>
             </a:fld>
             <a:endParaRPr lang="pt-BR"/>
           </a:p>
@@ -7052,7 +7053,7 @@
           <a:p>
             <a:fld id="{13015A94-D9CB-470F-A58C-5F43E2446D83}" type="datetimeFigureOut">
               <a:rPr lang="pt-BR" smtClean="0"/>
-              <a:t>03/09/2024</a:t>
+              <a:t>05/09/2024</a:t>
             </a:fld>
             <a:endParaRPr lang="pt-BR"/>
           </a:p>
@@ -7165,7 +7166,7 @@
           <a:p>
             <a:fld id="{13015A94-D9CB-470F-A58C-5F43E2446D83}" type="datetimeFigureOut">
               <a:rPr lang="pt-BR" smtClean="0"/>
-              <a:t>03/09/2024</a:t>
+              <a:t>05/09/2024</a:t>
             </a:fld>
             <a:endParaRPr lang="pt-BR"/>
           </a:p>
@@ -7476,7 +7477,7 @@
           <a:p>
             <a:fld id="{13015A94-D9CB-470F-A58C-5F43E2446D83}" type="datetimeFigureOut">
               <a:rPr lang="pt-BR" smtClean="0"/>
-              <a:t>03/09/2024</a:t>
+              <a:t>05/09/2024</a:t>
             </a:fld>
             <a:endParaRPr lang="pt-BR"/>
           </a:p>
@@ -7764,7 +7765,7 @@
           <a:p>
             <a:fld id="{13015A94-D9CB-470F-A58C-5F43E2446D83}" type="datetimeFigureOut">
               <a:rPr lang="pt-BR" smtClean="0"/>
-              <a:t>03/09/2024</a:t>
+              <a:t>05/09/2024</a:t>
             </a:fld>
             <a:endParaRPr lang="pt-BR"/>
           </a:p>
@@ -8005,7 +8006,7 @@
           <a:p>
             <a:fld id="{13015A94-D9CB-470F-A58C-5F43E2446D83}" type="datetimeFigureOut">
               <a:rPr lang="pt-BR" smtClean="0"/>
-              <a:t>03/09/2024</a:t>
+              <a:t>05/09/2024</a:t>
             </a:fld>
             <a:endParaRPr lang="pt-BR"/>
           </a:p>
@@ -13507,6 +13508,1696 @@
   <p:clrMapOvr>
     <a:masterClrMapping/>
   </p:clrMapOvr>
+</p:sld>
+</file>
+
+<file path=ppt/slides/slide15.xml><?xml version="1.0" encoding="utf-8"?>
+<p:sld xmlns:a="http://schemas.openxmlformats.org/drawingml/2006/main" xmlns:r="http://schemas.openxmlformats.org/officeDocument/2006/relationships" xmlns:p="http://schemas.openxmlformats.org/presentationml/2006/main">
+  <p:cSld>
+    <p:spTree>
+      <p:nvGrpSpPr>
+        <p:cNvPr id="1" name="">
+          <a:extLst>
+            <a:ext uri="{FF2B5EF4-FFF2-40B4-BE49-F238E27FC236}">
+              <a16:creationId xmlns:a16="http://schemas.microsoft.com/office/drawing/2014/main" id="{F235BFF9-5397-9F8C-870D-5BE468EAB1C7}"/>
+            </a:ext>
+          </a:extLst>
+        </p:cNvPr>
+        <p:cNvGrpSpPr/>
+        <p:nvPr/>
+      </p:nvGrpSpPr>
+      <p:grpSpPr>
+        <a:xfrm>
+          <a:off x="0" y="0"/>
+          <a:ext cx="0" cy="0"/>
+          <a:chOff x="0" y="0"/>
+          <a:chExt cx="0" cy="0"/>
+        </a:xfrm>
+      </p:grpSpPr>
+      <p:sp>
+        <p:nvSpPr>
+          <p:cNvPr id="2" name="Retângulo 1">
+            <a:extLst>
+              <a:ext uri="{FF2B5EF4-FFF2-40B4-BE49-F238E27FC236}">
+                <a16:creationId xmlns:a16="http://schemas.microsoft.com/office/drawing/2014/main" id="{8353834F-4FBC-2DA9-F893-9DC5400A77A5}"/>
+              </a:ext>
+            </a:extLst>
+          </p:cNvPr>
+          <p:cNvSpPr/>
+          <p:nvPr/>
+        </p:nvSpPr>
+        <p:spPr>
+          <a:xfrm>
+            <a:off x="355104" y="1426718"/>
+            <a:ext cx="11425561" cy="5294757"/>
+          </a:xfrm>
+          <a:prstGeom prst="rect">
+            <a:avLst/>
+          </a:prstGeom>
+          <a:solidFill>
+            <a:schemeClr val="accent2">
+              <a:lumMod val="20000"/>
+              <a:lumOff val="80000"/>
+            </a:schemeClr>
+          </a:solidFill>
+          <a:ln>
+            <a:solidFill>
+              <a:srgbClr val="007DA9"/>
+            </a:solidFill>
+          </a:ln>
+        </p:spPr>
+        <p:style>
+          <a:lnRef idx="2">
+            <a:schemeClr val="accent1">
+              <a:shade val="15000"/>
+            </a:schemeClr>
+          </a:lnRef>
+          <a:fillRef idx="1">
+            <a:schemeClr val="accent1"/>
+          </a:fillRef>
+          <a:effectRef idx="0">
+            <a:schemeClr val="accent1"/>
+          </a:effectRef>
+          <a:fontRef idx="minor">
+            <a:schemeClr val="lt1"/>
+          </a:fontRef>
+        </p:style>
+        <p:txBody>
+          <a:bodyPr rtlCol="0" anchor="ctr"/>
+          <a:lstStyle/>
+          <a:p>
+            <a:pPr algn="ctr"/>
+            <a:endParaRPr lang="pt-BR">
+              <a:noFill/>
+            </a:endParaRPr>
+          </a:p>
+        </p:txBody>
+      </p:sp>
+      <p:sp>
+        <p:nvSpPr>
+          <p:cNvPr id="3" name="CaixaDeTexto 2">
+            <a:extLst>
+              <a:ext uri="{FF2B5EF4-FFF2-40B4-BE49-F238E27FC236}">
+                <a16:creationId xmlns:a16="http://schemas.microsoft.com/office/drawing/2014/main" id="{B4B76515-92E6-3F65-0E51-6403CBF2B491}"/>
+              </a:ext>
+            </a:extLst>
+          </p:cNvPr>
+          <p:cNvSpPr txBox="1"/>
+          <p:nvPr/>
+        </p:nvSpPr>
+        <p:spPr>
+          <a:xfrm>
+            <a:off x="130373" y="169518"/>
+            <a:ext cx="10487075" cy="1015663"/>
+          </a:xfrm>
+          <a:prstGeom prst="rect">
+            <a:avLst/>
+          </a:prstGeom>
+          <a:noFill/>
+        </p:spPr>
+        <p:txBody>
+          <a:bodyPr wrap="square" rtlCol="0">
+            <a:spAutoFit/>
+          </a:bodyPr>
+          <a:lstStyle/>
+          <a:p>
+            <a:r>
+              <a:rPr lang="pt-BR" sz="6000" dirty="0">
+                <a:solidFill>
+                  <a:srgbClr val="007DA9"/>
+                </a:solidFill>
+                <a:latin typeface="Impact" panose="020B0806030902050204" pitchFamily="34" charset="0"/>
+              </a:rPr>
+              <a:t>Arquitetura</a:t>
+            </a:r>
+          </a:p>
+        </p:txBody>
+      </p:sp>
+      <p:sp>
+        <p:nvSpPr>
+          <p:cNvPr id="8" name="sketchy line">
+            <a:extLst>
+              <a:ext uri="{FF2B5EF4-FFF2-40B4-BE49-F238E27FC236}">
+                <a16:creationId xmlns:a16="http://schemas.microsoft.com/office/drawing/2014/main" id="{096863DC-7DB0-D58B-563A-D86C00F16744}"/>
+              </a:ext>
+              <a:ext uri="{C183D7F6-B498-43B3-948B-1728B52AA6E4}">
+                <adec:decorative xmlns:adec="http://schemas.microsoft.com/office/drawing/2017/decorative" val="1"/>
+              </a:ext>
+            </a:extLst>
+          </p:cNvPr>
+          <p:cNvSpPr/>
+          <p:nvPr>
+            <p:extLst>
+              <p:ext uri="{386F3935-93C4-4BCD-93E2-E3B085C9AB24}">
+                <p16:designElem xmlns:p16="http://schemas.microsoft.com/office/powerpoint/2015/main" val="1"/>
+              </p:ext>
+            </p:extLst>
+          </p:nvPr>
+        </p:nvSpPr>
+        <p:spPr>
+          <a:xfrm>
+            <a:off x="268062" y="1184695"/>
+            <a:ext cx="11727443" cy="100858"/>
+          </a:xfrm>
+          <a:custGeom>
+            <a:avLst/>
+            <a:gdLst>
+              <a:gd name="connsiteX0" fmla="*/ 0 w 11727443"/>
+              <a:gd name="connsiteY0" fmla="*/ 0 h 100858"/>
+              <a:gd name="connsiteX1" fmla="*/ 455301 w 11727443"/>
+              <a:gd name="connsiteY1" fmla="*/ 0 h 100858"/>
+              <a:gd name="connsiteX2" fmla="*/ 1379699 w 11727443"/>
+              <a:gd name="connsiteY2" fmla="*/ 0 h 100858"/>
+              <a:gd name="connsiteX3" fmla="*/ 2069549 w 11727443"/>
+              <a:gd name="connsiteY3" fmla="*/ 0 h 100858"/>
+              <a:gd name="connsiteX4" fmla="*/ 2524849 w 11727443"/>
+              <a:gd name="connsiteY4" fmla="*/ 0 h 100858"/>
+              <a:gd name="connsiteX5" fmla="*/ 2862876 w 11727443"/>
+              <a:gd name="connsiteY5" fmla="*/ 0 h 100858"/>
+              <a:gd name="connsiteX6" fmla="*/ 3787274 w 11727443"/>
+              <a:gd name="connsiteY6" fmla="*/ 0 h 100858"/>
+              <a:gd name="connsiteX7" fmla="*/ 4359849 w 11727443"/>
+              <a:gd name="connsiteY7" fmla="*/ 0 h 100858"/>
+              <a:gd name="connsiteX8" fmla="*/ 5284248 w 11727443"/>
+              <a:gd name="connsiteY8" fmla="*/ 0 h 100858"/>
+              <a:gd name="connsiteX9" fmla="*/ 5622274 w 11727443"/>
+              <a:gd name="connsiteY9" fmla="*/ 0 h 100858"/>
+              <a:gd name="connsiteX10" fmla="*/ 6077575 w 11727443"/>
+              <a:gd name="connsiteY10" fmla="*/ 0 h 100858"/>
+              <a:gd name="connsiteX11" fmla="*/ 7001973 w 11727443"/>
+              <a:gd name="connsiteY11" fmla="*/ 0 h 100858"/>
+              <a:gd name="connsiteX12" fmla="*/ 7926372 w 11727443"/>
+              <a:gd name="connsiteY12" fmla="*/ 0 h 100858"/>
+              <a:gd name="connsiteX13" fmla="*/ 8498947 w 11727443"/>
+              <a:gd name="connsiteY13" fmla="*/ 0 h 100858"/>
+              <a:gd name="connsiteX14" fmla="*/ 8836973 w 11727443"/>
+              <a:gd name="connsiteY14" fmla="*/ 0 h 100858"/>
+              <a:gd name="connsiteX15" fmla="*/ 9644097 w 11727443"/>
+              <a:gd name="connsiteY15" fmla="*/ 0 h 100858"/>
+              <a:gd name="connsiteX16" fmla="*/ 10333947 w 11727443"/>
+              <a:gd name="connsiteY16" fmla="*/ 0 h 100858"/>
+              <a:gd name="connsiteX17" fmla="*/ 10906522 w 11727443"/>
+              <a:gd name="connsiteY17" fmla="*/ 0 h 100858"/>
+              <a:gd name="connsiteX18" fmla="*/ 11727443 w 11727443"/>
+              <a:gd name="connsiteY18" fmla="*/ 0 h 100858"/>
+              <a:gd name="connsiteX19" fmla="*/ 11727443 w 11727443"/>
+              <a:gd name="connsiteY19" fmla="*/ 100858 h 100858"/>
+              <a:gd name="connsiteX20" fmla="*/ 10920319 w 11727443"/>
+              <a:gd name="connsiteY20" fmla="*/ 100858 h 100858"/>
+              <a:gd name="connsiteX21" fmla="*/ 10465018 w 11727443"/>
+              <a:gd name="connsiteY21" fmla="*/ 100858 h 100858"/>
+              <a:gd name="connsiteX22" fmla="*/ 9892443 w 11727443"/>
+              <a:gd name="connsiteY22" fmla="*/ 100858 h 100858"/>
+              <a:gd name="connsiteX23" fmla="*/ 8968045 w 11727443"/>
+              <a:gd name="connsiteY23" fmla="*/ 100858 h 100858"/>
+              <a:gd name="connsiteX24" fmla="*/ 8630018 w 11727443"/>
+              <a:gd name="connsiteY24" fmla="*/ 100858 h 100858"/>
+              <a:gd name="connsiteX25" fmla="*/ 8291992 w 11727443"/>
+              <a:gd name="connsiteY25" fmla="*/ 100858 h 100858"/>
+              <a:gd name="connsiteX26" fmla="*/ 7953966 w 11727443"/>
+              <a:gd name="connsiteY26" fmla="*/ 100858 h 100858"/>
+              <a:gd name="connsiteX27" fmla="*/ 7146842 w 11727443"/>
+              <a:gd name="connsiteY27" fmla="*/ 100858 h 100858"/>
+              <a:gd name="connsiteX28" fmla="*/ 6691541 w 11727443"/>
+              <a:gd name="connsiteY28" fmla="*/ 100858 h 100858"/>
+              <a:gd name="connsiteX29" fmla="*/ 5884417 w 11727443"/>
+              <a:gd name="connsiteY29" fmla="*/ 100858 h 100858"/>
+              <a:gd name="connsiteX30" fmla="*/ 5077293 w 11727443"/>
+              <a:gd name="connsiteY30" fmla="*/ 100858 h 100858"/>
+              <a:gd name="connsiteX31" fmla="*/ 4621992 w 11727443"/>
+              <a:gd name="connsiteY31" fmla="*/ 100858 h 100858"/>
+              <a:gd name="connsiteX32" fmla="*/ 3932143 w 11727443"/>
+              <a:gd name="connsiteY32" fmla="*/ 100858 h 100858"/>
+              <a:gd name="connsiteX33" fmla="*/ 3359567 w 11727443"/>
+              <a:gd name="connsiteY33" fmla="*/ 100858 h 100858"/>
+              <a:gd name="connsiteX34" fmla="*/ 2435169 w 11727443"/>
+              <a:gd name="connsiteY34" fmla="*/ 100858 h 100858"/>
+              <a:gd name="connsiteX35" fmla="*/ 1745319 w 11727443"/>
+              <a:gd name="connsiteY35" fmla="*/ 100858 h 100858"/>
+              <a:gd name="connsiteX36" fmla="*/ 938195 w 11727443"/>
+              <a:gd name="connsiteY36" fmla="*/ 100858 h 100858"/>
+              <a:gd name="connsiteX37" fmla="*/ 600169 w 11727443"/>
+              <a:gd name="connsiteY37" fmla="*/ 100858 h 100858"/>
+              <a:gd name="connsiteX38" fmla="*/ 0 w 11727443"/>
+              <a:gd name="connsiteY38" fmla="*/ 100858 h 100858"/>
+              <a:gd name="connsiteX39" fmla="*/ 0 w 11727443"/>
+              <a:gd name="connsiteY39" fmla="*/ 0 h 100858"/>
+            </a:gdLst>
+            <a:ahLst/>
+            <a:cxnLst>
+              <a:cxn ang="0">
+                <a:pos x="connsiteX0" y="connsiteY0"/>
+              </a:cxn>
+              <a:cxn ang="0">
+                <a:pos x="connsiteX1" y="connsiteY1"/>
+              </a:cxn>
+              <a:cxn ang="0">
+                <a:pos x="connsiteX2" y="connsiteY2"/>
+              </a:cxn>
+              <a:cxn ang="0">
+                <a:pos x="connsiteX3" y="connsiteY3"/>
+              </a:cxn>
+              <a:cxn ang="0">
+                <a:pos x="connsiteX4" y="connsiteY4"/>
+              </a:cxn>
+              <a:cxn ang="0">
+                <a:pos x="connsiteX5" y="connsiteY5"/>
+              </a:cxn>
+              <a:cxn ang="0">
+                <a:pos x="connsiteX6" y="connsiteY6"/>
+              </a:cxn>
+              <a:cxn ang="0">
+                <a:pos x="connsiteX7" y="connsiteY7"/>
+              </a:cxn>
+              <a:cxn ang="0">
+                <a:pos x="connsiteX8" y="connsiteY8"/>
+              </a:cxn>
+              <a:cxn ang="0">
+                <a:pos x="connsiteX9" y="connsiteY9"/>
+              </a:cxn>
+              <a:cxn ang="0">
+                <a:pos x="connsiteX10" y="connsiteY10"/>
+              </a:cxn>
+              <a:cxn ang="0">
+                <a:pos x="connsiteX11" y="connsiteY11"/>
+              </a:cxn>
+              <a:cxn ang="0">
+                <a:pos x="connsiteX12" y="connsiteY12"/>
+              </a:cxn>
+              <a:cxn ang="0">
+                <a:pos x="connsiteX13" y="connsiteY13"/>
+              </a:cxn>
+              <a:cxn ang="0">
+                <a:pos x="connsiteX14" y="connsiteY14"/>
+              </a:cxn>
+              <a:cxn ang="0">
+                <a:pos x="connsiteX15" y="connsiteY15"/>
+              </a:cxn>
+              <a:cxn ang="0">
+                <a:pos x="connsiteX16" y="connsiteY16"/>
+              </a:cxn>
+              <a:cxn ang="0">
+                <a:pos x="connsiteX17" y="connsiteY17"/>
+              </a:cxn>
+              <a:cxn ang="0">
+                <a:pos x="connsiteX18" y="connsiteY18"/>
+              </a:cxn>
+              <a:cxn ang="0">
+                <a:pos x="connsiteX19" y="connsiteY19"/>
+              </a:cxn>
+              <a:cxn ang="0">
+                <a:pos x="connsiteX20" y="connsiteY20"/>
+              </a:cxn>
+              <a:cxn ang="0">
+                <a:pos x="connsiteX21" y="connsiteY21"/>
+              </a:cxn>
+              <a:cxn ang="0">
+                <a:pos x="connsiteX22" y="connsiteY22"/>
+              </a:cxn>
+              <a:cxn ang="0">
+                <a:pos x="connsiteX23" y="connsiteY23"/>
+              </a:cxn>
+              <a:cxn ang="0">
+                <a:pos x="connsiteX24" y="connsiteY24"/>
+              </a:cxn>
+              <a:cxn ang="0">
+                <a:pos x="connsiteX25" y="connsiteY25"/>
+              </a:cxn>
+              <a:cxn ang="0">
+                <a:pos x="connsiteX26" y="connsiteY26"/>
+              </a:cxn>
+              <a:cxn ang="0">
+                <a:pos x="connsiteX27" y="connsiteY27"/>
+              </a:cxn>
+              <a:cxn ang="0">
+                <a:pos x="connsiteX28" y="connsiteY28"/>
+              </a:cxn>
+              <a:cxn ang="0">
+                <a:pos x="connsiteX29" y="connsiteY29"/>
+              </a:cxn>
+              <a:cxn ang="0">
+                <a:pos x="connsiteX30" y="connsiteY30"/>
+              </a:cxn>
+              <a:cxn ang="0">
+                <a:pos x="connsiteX31" y="connsiteY31"/>
+              </a:cxn>
+              <a:cxn ang="0">
+                <a:pos x="connsiteX32" y="connsiteY32"/>
+              </a:cxn>
+              <a:cxn ang="0">
+                <a:pos x="connsiteX33" y="connsiteY33"/>
+              </a:cxn>
+              <a:cxn ang="0">
+                <a:pos x="connsiteX34" y="connsiteY34"/>
+              </a:cxn>
+              <a:cxn ang="0">
+                <a:pos x="connsiteX35" y="connsiteY35"/>
+              </a:cxn>
+              <a:cxn ang="0">
+                <a:pos x="connsiteX36" y="connsiteY36"/>
+              </a:cxn>
+              <a:cxn ang="0">
+                <a:pos x="connsiteX37" y="connsiteY37"/>
+              </a:cxn>
+              <a:cxn ang="0">
+                <a:pos x="connsiteX38" y="connsiteY38"/>
+              </a:cxn>
+              <a:cxn ang="0">
+                <a:pos x="connsiteX39" y="connsiteY39"/>
+              </a:cxn>
+            </a:cxnLst>
+            <a:rect l="l" t="t" r="r" b="b"/>
+            <a:pathLst>
+              <a:path w="11727443" h="100858" fill="none" extrusionOk="0">
+                <a:moveTo>
+                  <a:pt x="0" y="0"/>
+                </a:moveTo>
+                <a:cubicBezTo>
+                  <a:pt x="177575" y="-8335"/>
+                  <a:pt x="289292" y="-22372"/>
+                  <a:pt x="455301" y="0"/>
+                </a:cubicBezTo>
+                <a:cubicBezTo>
+                  <a:pt x="621310" y="22372"/>
+                  <a:pt x="959229" y="316"/>
+                  <a:pt x="1379699" y="0"/>
+                </a:cubicBezTo>
+                <a:cubicBezTo>
+                  <a:pt x="1800169" y="-316"/>
+                  <a:pt x="1910290" y="-19988"/>
+                  <a:pt x="2069549" y="0"/>
+                </a:cubicBezTo>
+                <a:cubicBezTo>
+                  <a:pt x="2228808" y="19988"/>
+                  <a:pt x="2328018" y="-6436"/>
+                  <a:pt x="2524849" y="0"/>
+                </a:cubicBezTo>
+                <a:cubicBezTo>
+                  <a:pt x="2721680" y="6436"/>
+                  <a:pt x="2744923" y="692"/>
+                  <a:pt x="2862876" y="0"/>
+                </a:cubicBezTo>
+                <a:cubicBezTo>
+                  <a:pt x="2980829" y="-692"/>
+                  <a:pt x="3455105" y="28803"/>
+                  <a:pt x="3787274" y="0"/>
+                </a:cubicBezTo>
+                <a:cubicBezTo>
+                  <a:pt x="4119443" y="-28803"/>
+                  <a:pt x="4093258" y="3515"/>
+                  <a:pt x="4359849" y="0"/>
+                </a:cubicBezTo>
+                <a:cubicBezTo>
+                  <a:pt x="4626441" y="-3515"/>
+                  <a:pt x="4994558" y="-15931"/>
+                  <a:pt x="5284248" y="0"/>
+                </a:cubicBezTo>
+                <a:cubicBezTo>
+                  <a:pt x="5573938" y="15931"/>
+                  <a:pt x="5518095" y="-13412"/>
+                  <a:pt x="5622274" y="0"/>
+                </a:cubicBezTo>
+                <a:cubicBezTo>
+                  <a:pt x="5726453" y="13412"/>
+                  <a:pt x="5919345" y="19043"/>
+                  <a:pt x="6077575" y="0"/>
+                </a:cubicBezTo>
+                <a:cubicBezTo>
+                  <a:pt x="6235805" y="-19043"/>
+                  <a:pt x="6637812" y="29609"/>
+                  <a:pt x="7001973" y="0"/>
+                </a:cubicBezTo>
+                <a:cubicBezTo>
+                  <a:pt x="7366134" y="-29609"/>
+                  <a:pt x="7716303" y="17424"/>
+                  <a:pt x="7926372" y="0"/>
+                </a:cubicBezTo>
+                <a:cubicBezTo>
+                  <a:pt x="8136441" y="-17424"/>
+                  <a:pt x="8378864" y="-19420"/>
+                  <a:pt x="8498947" y="0"/>
+                </a:cubicBezTo>
+                <a:cubicBezTo>
+                  <a:pt x="8619031" y="19420"/>
+                  <a:pt x="8765062" y="-15679"/>
+                  <a:pt x="8836973" y="0"/>
+                </a:cubicBezTo>
+                <a:cubicBezTo>
+                  <a:pt x="8908884" y="15679"/>
+                  <a:pt x="9288035" y="12756"/>
+                  <a:pt x="9644097" y="0"/>
+                </a:cubicBezTo>
+                <a:cubicBezTo>
+                  <a:pt x="10000159" y="-12756"/>
+                  <a:pt x="10089663" y="-5649"/>
+                  <a:pt x="10333947" y="0"/>
+                </a:cubicBezTo>
+                <a:cubicBezTo>
+                  <a:pt x="10578231" y="5649"/>
+                  <a:pt x="10785095" y="27917"/>
+                  <a:pt x="10906522" y="0"/>
+                </a:cubicBezTo>
+                <a:cubicBezTo>
+                  <a:pt x="11027949" y="-27917"/>
+                  <a:pt x="11562609" y="31188"/>
+                  <a:pt x="11727443" y="0"/>
+                </a:cubicBezTo>
+                <a:cubicBezTo>
+                  <a:pt x="11723584" y="38217"/>
+                  <a:pt x="11731691" y="73296"/>
+                  <a:pt x="11727443" y="100858"/>
+                </a:cubicBezTo>
+                <a:cubicBezTo>
+                  <a:pt x="11381154" y="139297"/>
+                  <a:pt x="11163895" y="69647"/>
+                  <a:pt x="10920319" y="100858"/>
+                </a:cubicBezTo>
+                <a:cubicBezTo>
+                  <a:pt x="10676743" y="132069"/>
+                  <a:pt x="10625983" y="117071"/>
+                  <a:pt x="10465018" y="100858"/>
+                </a:cubicBezTo>
+                <a:cubicBezTo>
+                  <a:pt x="10304053" y="84645"/>
+                  <a:pt x="10063410" y="105790"/>
+                  <a:pt x="9892443" y="100858"/>
+                </a:cubicBezTo>
+                <a:cubicBezTo>
+                  <a:pt x="9721477" y="95926"/>
+                  <a:pt x="9298902" y="55708"/>
+                  <a:pt x="8968045" y="100858"/>
+                </a:cubicBezTo>
+                <a:cubicBezTo>
+                  <a:pt x="8637188" y="146008"/>
+                  <a:pt x="8753098" y="98295"/>
+                  <a:pt x="8630018" y="100858"/>
+                </a:cubicBezTo>
+                <a:cubicBezTo>
+                  <a:pt x="8506938" y="103421"/>
+                  <a:pt x="8382809" y="104606"/>
+                  <a:pt x="8291992" y="100858"/>
+                </a:cubicBezTo>
+                <a:cubicBezTo>
+                  <a:pt x="8201175" y="97110"/>
+                  <a:pt x="8042573" y="88227"/>
+                  <a:pt x="7953966" y="100858"/>
+                </a:cubicBezTo>
+                <a:cubicBezTo>
+                  <a:pt x="7865359" y="113489"/>
+                  <a:pt x="7327260" y="71433"/>
+                  <a:pt x="7146842" y="100858"/>
+                </a:cubicBezTo>
+                <a:cubicBezTo>
+                  <a:pt x="6966424" y="130283"/>
+                  <a:pt x="6836691" y="78893"/>
+                  <a:pt x="6691541" y="100858"/>
+                </a:cubicBezTo>
+                <a:cubicBezTo>
+                  <a:pt x="6546391" y="122823"/>
+                  <a:pt x="6161732" y="96929"/>
+                  <a:pt x="5884417" y="100858"/>
+                </a:cubicBezTo>
+                <a:cubicBezTo>
+                  <a:pt x="5607102" y="104787"/>
+                  <a:pt x="5399769" y="71203"/>
+                  <a:pt x="5077293" y="100858"/>
+                </a:cubicBezTo>
+                <a:cubicBezTo>
+                  <a:pt x="4754817" y="130513"/>
+                  <a:pt x="4780101" y="110562"/>
+                  <a:pt x="4621992" y="100858"/>
+                </a:cubicBezTo>
+                <a:cubicBezTo>
+                  <a:pt x="4463883" y="91154"/>
+                  <a:pt x="4080268" y="82653"/>
+                  <a:pt x="3932143" y="100858"/>
+                </a:cubicBezTo>
+                <a:cubicBezTo>
+                  <a:pt x="3784018" y="119063"/>
+                  <a:pt x="3606068" y="107585"/>
+                  <a:pt x="3359567" y="100858"/>
+                </a:cubicBezTo>
+                <a:cubicBezTo>
+                  <a:pt x="3113066" y="94131"/>
+                  <a:pt x="2833730" y="108463"/>
+                  <a:pt x="2435169" y="100858"/>
+                </a:cubicBezTo>
+                <a:cubicBezTo>
+                  <a:pt x="2036608" y="93253"/>
+                  <a:pt x="1979570" y="109496"/>
+                  <a:pt x="1745319" y="100858"/>
+                </a:cubicBezTo>
+                <a:cubicBezTo>
+                  <a:pt x="1511068" y="92221"/>
+                  <a:pt x="1304277" y="99602"/>
+                  <a:pt x="938195" y="100858"/>
+                </a:cubicBezTo>
+                <a:cubicBezTo>
+                  <a:pt x="572113" y="102114"/>
+                  <a:pt x="673750" y="115329"/>
+                  <a:pt x="600169" y="100858"/>
+                </a:cubicBezTo>
+                <a:cubicBezTo>
+                  <a:pt x="526588" y="86387"/>
+                  <a:pt x="223952" y="122492"/>
+                  <a:pt x="0" y="100858"/>
+                </a:cubicBezTo>
+                <a:cubicBezTo>
+                  <a:pt x="-124" y="56937"/>
+                  <a:pt x="-3196" y="35397"/>
+                  <a:pt x="0" y="0"/>
+                </a:cubicBezTo>
+                <a:close/>
+              </a:path>
+              <a:path w="11727443" h="100858" stroke="0" extrusionOk="0">
+                <a:moveTo>
+                  <a:pt x="0" y="0"/>
+                </a:moveTo>
+                <a:cubicBezTo>
+                  <a:pt x="226598" y="-20463"/>
+                  <a:pt x="284703" y="21278"/>
+                  <a:pt x="455301" y="0"/>
+                </a:cubicBezTo>
+                <a:cubicBezTo>
+                  <a:pt x="625899" y="-21278"/>
+                  <a:pt x="975360" y="-38169"/>
+                  <a:pt x="1379699" y="0"/>
+                </a:cubicBezTo>
+                <a:cubicBezTo>
+                  <a:pt x="1784038" y="38169"/>
+                  <a:pt x="1553897" y="10715"/>
+                  <a:pt x="1717725" y="0"/>
+                </a:cubicBezTo>
+                <a:cubicBezTo>
+                  <a:pt x="1881553" y="-10715"/>
+                  <a:pt x="1957404" y="7512"/>
+                  <a:pt x="2055752" y="0"/>
+                </a:cubicBezTo>
+                <a:cubicBezTo>
+                  <a:pt x="2154100" y="-7512"/>
+                  <a:pt x="2455093" y="6931"/>
+                  <a:pt x="2745601" y="0"/>
+                </a:cubicBezTo>
+                <a:cubicBezTo>
+                  <a:pt x="3036109" y="-6931"/>
+                  <a:pt x="3200578" y="-6899"/>
+                  <a:pt x="3318177" y="0"/>
+                </a:cubicBezTo>
+                <a:cubicBezTo>
+                  <a:pt x="3435776" y="6899"/>
+                  <a:pt x="3830972" y="-29023"/>
+                  <a:pt x="4125301" y="0"/>
+                </a:cubicBezTo>
+                <a:cubicBezTo>
+                  <a:pt x="4419630" y="29023"/>
+                  <a:pt x="4438628" y="-3380"/>
+                  <a:pt x="4580601" y="0"/>
+                </a:cubicBezTo>
+                <a:cubicBezTo>
+                  <a:pt x="4722574" y="3380"/>
+                  <a:pt x="5287872" y="-26084"/>
+                  <a:pt x="5505000" y="0"/>
+                </a:cubicBezTo>
+                <a:cubicBezTo>
+                  <a:pt x="5722128" y="26084"/>
+                  <a:pt x="5845495" y="-3138"/>
+                  <a:pt x="6077575" y="0"/>
+                </a:cubicBezTo>
+                <a:cubicBezTo>
+                  <a:pt x="6309655" y="3138"/>
+                  <a:pt x="6416497" y="-9038"/>
+                  <a:pt x="6532876" y="0"/>
+                </a:cubicBezTo>
+                <a:cubicBezTo>
+                  <a:pt x="6649255" y="9038"/>
+                  <a:pt x="6798774" y="17432"/>
+                  <a:pt x="6988176" y="0"/>
+                </a:cubicBezTo>
+                <a:cubicBezTo>
+                  <a:pt x="7177578" y="-17432"/>
+                  <a:pt x="7432115" y="-1508"/>
+                  <a:pt x="7560751" y="0"/>
+                </a:cubicBezTo>
+                <a:cubicBezTo>
+                  <a:pt x="7689387" y="1508"/>
+                  <a:pt x="7817048" y="19459"/>
+                  <a:pt x="8016052" y="0"/>
+                </a:cubicBezTo>
+                <a:cubicBezTo>
+                  <a:pt x="8215056" y="-19459"/>
+                  <a:pt x="8384141" y="13593"/>
+                  <a:pt x="8705902" y="0"/>
+                </a:cubicBezTo>
+                <a:cubicBezTo>
+                  <a:pt x="9027663" y="-13593"/>
+                  <a:pt x="8932873" y="-16432"/>
+                  <a:pt x="9043928" y="0"/>
+                </a:cubicBezTo>
+                <a:cubicBezTo>
+                  <a:pt x="9154983" y="16432"/>
+                  <a:pt x="9568699" y="-30219"/>
+                  <a:pt x="9733778" y="0"/>
+                </a:cubicBezTo>
+                <a:cubicBezTo>
+                  <a:pt x="9898857" y="30219"/>
+                  <a:pt x="9973728" y="-1849"/>
+                  <a:pt x="10071804" y="0"/>
+                </a:cubicBezTo>
+                <a:cubicBezTo>
+                  <a:pt x="10169880" y="1849"/>
+                  <a:pt x="10558830" y="-12560"/>
+                  <a:pt x="10996202" y="0"/>
+                </a:cubicBezTo>
+                <a:cubicBezTo>
+                  <a:pt x="11433574" y="12560"/>
+                  <a:pt x="11579031" y="-6546"/>
+                  <a:pt x="11727443" y="0"/>
+                </a:cubicBezTo>
+                <a:cubicBezTo>
+                  <a:pt x="11729168" y="25018"/>
+                  <a:pt x="11723362" y="74256"/>
+                  <a:pt x="11727443" y="100858"/>
+                </a:cubicBezTo>
+                <a:cubicBezTo>
+                  <a:pt x="11466834" y="85519"/>
+                  <a:pt x="11273864" y="83363"/>
+                  <a:pt x="11154868" y="100858"/>
+                </a:cubicBezTo>
+                <a:cubicBezTo>
+                  <a:pt x="11035872" y="118353"/>
+                  <a:pt x="10917509" y="98250"/>
+                  <a:pt x="10816842" y="100858"/>
+                </a:cubicBezTo>
+                <a:cubicBezTo>
+                  <a:pt x="10716175" y="103466"/>
+                  <a:pt x="10190281" y="93289"/>
+                  <a:pt x="9892443" y="100858"/>
+                </a:cubicBezTo>
+                <a:cubicBezTo>
+                  <a:pt x="9594605" y="108427"/>
+                  <a:pt x="9385168" y="118111"/>
+                  <a:pt x="9202594" y="100858"/>
+                </a:cubicBezTo>
+                <a:cubicBezTo>
+                  <a:pt x="9020020" y="83605"/>
+                  <a:pt x="8470284" y="126256"/>
+                  <a:pt x="8278195" y="100858"/>
+                </a:cubicBezTo>
+                <a:cubicBezTo>
+                  <a:pt x="8086106" y="75460"/>
+                  <a:pt x="7779236" y="101234"/>
+                  <a:pt x="7588345" y="100858"/>
+                </a:cubicBezTo>
+                <a:cubicBezTo>
+                  <a:pt x="7397454" y="100483"/>
+                  <a:pt x="7324210" y="98320"/>
+                  <a:pt x="7250319" y="100858"/>
+                </a:cubicBezTo>
+                <a:cubicBezTo>
+                  <a:pt x="7176428" y="103396"/>
+                  <a:pt x="6743284" y="112839"/>
+                  <a:pt x="6325921" y="100858"/>
+                </a:cubicBezTo>
+                <a:cubicBezTo>
+                  <a:pt x="5908558" y="88877"/>
+                  <a:pt x="6095670" y="116342"/>
+                  <a:pt x="5870620" y="100858"/>
+                </a:cubicBezTo>
+                <a:cubicBezTo>
+                  <a:pt x="5645570" y="85374"/>
+                  <a:pt x="5700885" y="115088"/>
+                  <a:pt x="5532594" y="100858"/>
+                </a:cubicBezTo>
+                <a:cubicBezTo>
+                  <a:pt x="5364303" y="86628"/>
+                  <a:pt x="5212740" y="105293"/>
+                  <a:pt x="4960019" y="100858"/>
+                </a:cubicBezTo>
+                <a:cubicBezTo>
+                  <a:pt x="4707298" y="96423"/>
+                  <a:pt x="4491720" y="108840"/>
+                  <a:pt x="4035620" y="100858"/>
+                </a:cubicBezTo>
+                <a:cubicBezTo>
+                  <a:pt x="3579520" y="92876"/>
+                  <a:pt x="3768890" y="79226"/>
+                  <a:pt x="3580319" y="100858"/>
+                </a:cubicBezTo>
+                <a:cubicBezTo>
+                  <a:pt x="3391748" y="122490"/>
+                  <a:pt x="3059393" y="71723"/>
+                  <a:pt x="2655921" y="100858"/>
+                </a:cubicBezTo>
+                <a:cubicBezTo>
+                  <a:pt x="2252449" y="129993"/>
+                  <a:pt x="2021995" y="121740"/>
+                  <a:pt x="1848797" y="100858"/>
+                </a:cubicBezTo>
+                <a:cubicBezTo>
+                  <a:pt x="1675599" y="79976"/>
+                  <a:pt x="1263502" y="106737"/>
+                  <a:pt x="924398" y="100858"/>
+                </a:cubicBezTo>
+                <a:cubicBezTo>
+                  <a:pt x="585294" y="94979"/>
+                  <a:pt x="216313" y="56521"/>
+                  <a:pt x="0" y="100858"/>
+                </a:cubicBezTo>
+                <a:cubicBezTo>
+                  <a:pt x="-4094" y="59488"/>
+                  <a:pt x="2375" y="29231"/>
+                  <a:pt x="0" y="0"/>
+                </a:cubicBezTo>
+                <a:close/>
+              </a:path>
+            </a:pathLst>
+          </a:custGeom>
+          <a:solidFill>
+            <a:srgbClr val="007DA9"/>
+          </a:solidFill>
+          <a:ln w="44450" cap="rnd">
+            <a:solidFill>
+              <a:srgbClr val="007DA9"/>
+            </a:solidFill>
+            <a:round/>
+            <a:extLst>
+              <a:ext uri="{C807C97D-BFC1-408E-A445-0C87EB9F89A2}">
+                <ask:lineSketchStyleProps xmlns:ask="http://schemas.microsoft.com/office/drawing/2018/sketchyshapes" sd="2863741219">
+                  <a:prstGeom prst="rect">
+                    <a:avLst/>
+                  </a:prstGeom>
+                  <ask:type>
+                    <ask:lineSketchFreehand/>
+                  </ask:type>
+                </ask:lineSketchStyleProps>
+              </a:ext>
+            </a:extLst>
+          </a:ln>
+        </p:spPr>
+        <p:style>
+          <a:lnRef idx="2">
+            <a:schemeClr val="accent1">
+              <a:shade val="50000"/>
+            </a:schemeClr>
+          </a:lnRef>
+          <a:fillRef idx="1">
+            <a:schemeClr val="accent1"/>
+          </a:fillRef>
+          <a:effectRef idx="0">
+            <a:schemeClr val="accent1"/>
+          </a:effectRef>
+          <a:fontRef idx="minor">
+            <a:schemeClr val="lt1"/>
+          </a:fontRef>
+        </p:style>
+        <p:txBody>
+          <a:bodyPr rtlCol="0" anchor="ctr"/>
+          <a:lstStyle/>
+          <a:p>
+            <a:pPr algn="ctr"/>
+            <a:r>
+              <a:rPr lang="en-US" dirty="0">
+                <a:solidFill>
+                  <a:srgbClr val="007DA9"/>
+                </a:solidFill>
+              </a:rPr>
+              <a:t>‘</a:t>
+            </a:r>
+          </a:p>
+        </p:txBody>
+      </p:sp>
+      <p:pic>
+        <p:nvPicPr>
+          <p:cNvPr id="7" name="Imagem 6" descr="Interface gráfica do usuário, Texto, Aplicativo&#10;&#10;Descrição gerada automaticamente">
+            <a:extLst>
+              <a:ext uri="{FF2B5EF4-FFF2-40B4-BE49-F238E27FC236}">
+                <a16:creationId xmlns:a16="http://schemas.microsoft.com/office/drawing/2014/main" id="{D54FB843-594D-A9C4-4317-1B0A9E87792C}"/>
+              </a:ext>
+            </a:extLst>
+          </p:cNvPr>
+          <p:cNvPicPr>
+            <a:picLocks noChangeAspect="1"/>
+          </p:cNvPicPr>
+          <p:nvPr/>
+        </p:nvPicPr>
+        <p:blipFill>
+          <a:blip r:embed="rId2">
+            <a:extLst>
+              <a:ext uri="{28A0092B-C50C-407E-A947-70E740481C1C}">
+                <a14:useLocalDpi xmlns:a14="http://schemas.microsoft.com/office/drawing/2010/main" val="0"/>
+              </a:ext>
+            </a:extLst>
+          </a:blip>
+          <a:stretch>
+            <a:fillRect/>
+          </a:stretch>
+        </p:blipFill>
+        <p:spPr>
+          <a:xfrm>
+            <a:off x="539369" y="1529624"/>
+            <a:ext cx="9171302" cy="5158858"/>
+          </a:xfrm>
+          <a:prstGeom prst="rect">
+            <a:avLst/>
+          </a:prstGeom>
+        </p:spPr>
+      </p:pic>
+      <p:sp>
+        <p:nvSpPr>
+          <p:cNvPr id="10" name="Retângulo 9">
+            <a:extLst>
+              <a:ext uri="{FF2B5EF4-FFF2-40B4-BE49-F238E27FC236}">
+                <a16:creationId xmlns:a16="http://schemas.microsoft.com/office/drawing/2014/main" id="{E80B6692-33A2-A243-2D19-AEEA445F07D0}"/>
+              </a:ext>
+            </a:extLst>
+          </p:cNvPr>
+          <p:cNvSpPr/>
+          <p:nvPr/>
+        </p:nvSpPr>
+        <p:spPr>
+          <a:xfrm>
+            <a:off x="10074960" y="1529624"/>
+            <a:ext cx="1328379" cy="391540"/>
+          </a:xfrm>
+          <a:prstGeom prst="rect">
+            <a:avLst/>
+          </a:prstGeom>
+          <a:solidFill>
+            <a:srgbClr val="007DA9"/>
+          </a:solidFill>
+        </p:spPr>
+        <p:style>
+          <a:lnRef idx="2">
+            <a:schemeClr val="accent1">
+              <a:shade val="15000"/>
+            </a:schemeClr>
+          </a:lnRef>
+          <a:fillRef idx="1">
+            <a:schemeClr val="accent1"/>
+          </a:fillRef>
+          <a:effectRef idx="0">
+            <a:schemeClr val="accent1"/>
+          </a:effectRef>
+          <a:fontRef idx="minor">
+            <a:schemeClr val="lt1"/>
+          </a:fontRef>
+        </p:style>
+        <p:txBody>
+          <a:bodyPr rtlCol="0" anchor="ctr"/>
+          <a:lstStyle/>
+          <a:p>
+            <a:pPr algn="ctr"/>
+            <a:r>
+              <a:rPr lang="pt-BR" dirty="0">
+                <a:latin typeface="Impact" panose="020B0806030902050204" pitchFamily="34" charset="0"/>
+              </a:rPr>
+              <a:t>Parser</a:t>
+            </a:r>
+          </a:p>
+        </p:txBody>
+      </p:sp>
+      <p:sp>
+        <p:nvSpPr>
+          <p:cNvPr id="11" name="Retângulo 10">
+            <a:extLst>
+              <a:ext uri="{FF2B5EF4-FFF2-40B4-BE49-F238E27FC236}">
+                <a16:creationId xmlns:a16="http://schemas.microsoft.com/office/drawing/2014/main" id="{F4123A26-F11D-CD26-795B-D00B084BA0A2}"/>
+              </a:ext>
+            </a:extLst>
+          </p:cNvPr>
+          <p:cNvSpPr/>
+          <p:nvPr/>
+        </p:nvSpPr>
+        <p:spPr>
+          <a:xfrm>
+            <a:off x="10074959" y="2053093"/>
+            <a:ext cx="1328379" cy="391540"/>
+          </a:xfrm>
+          <a:prstGeom prst="rect">
+            <a:avLst/>
+          </a:prstGeom>
+          <a:solidFill>
+            <a:srgbClr val="007DA9"/>
+          </a:solidFill>
+        </p:spPr>
+        <p:style>
+          <a:lnRef idx="2">
+            <a:schemeClr val="accent1">
+              <a:shade val="15000"/>
+            </a:schemeClr>
+          </a:lnRef>
+          <a:fillRef idx="1">
+            <a:schemeClr val="accent1"/>
+          </a:fillRef>
+          <a:effectRef idx="0">
+            <a:schemeClr val="accent1"/>
+          </a:effectRef>
+          <a:fontRef idx="minor">
+            <a:schemeClr val="lt1"/>
+          </a:fontRef>
+        </p:style>
+        <p:txBody>
+          <a:bodyPr rtlCol="0" anchor="ctr"/>
+          <a:lstStyle/>
+          <a:p>
+            <a:pPr algn="ctr"/>
+            <a:r>
+              <a:rPr lang="pt-BR" dirty="0" err="1">
+                <a:latin typeface="Impact" panose="020B0806030902050204" pitchFamily="34" charset="0"/>
+              </a:rPr>
+              <a:t>Optimizer</a:t>
+            </a:r>
+            <a:endParaRPr lang="pt-BR" dirty="0">
+              <a:latin typeface="Impact" panose="020B0806030902050204" pitchFamily="34" charset="0"/>
+            </a:endParaRPr>
+          </a:p>
+        </p:txBody>
+      </p:sp>
+      <p:sp>
+        <p:nvSpPr>
+          <p:cNvPr id="12" name="Retângulo 11">
+            <a:extLst>
+              <a:ext uri="{FF2B5EF4-FFF2-40B4-BE49-F238E27FC236}">
+                <a16:creationId xmlns:a16="http://schemas.microsoft.com/office/drawing/2014/main" id="{C6E0005F-45F2-65F1-28D6-B13399A01E9F}"/>
+              </a:ext>
+            </a:extLst>
+          </p:cNvPr>
+          <p:cNvSpPr/>
+          <p:nvPr/>
+        </p:nvSpPr>
+        <p:spPr>
+          <a:xfrm>
+            <a:off x="10074958" y="2573323"/>
+            <a:ext cx="1328379" cy="391540"/>
+          </a:xfrm>
+          <a:prstGeom prst="rect">
+            <a:avLst/>
+          </a:prstGeom>
+          <a:solidFill>
+            <a:srgbClr val="007DA9"/>
+          </a:solidFill>
+        </p:spPr>
+        <p:style>
+          <a:lnRef idx="2">
+            <a:schemeClr val="accent1">
+              <a:shade val="15000"/>
+            </a:schemeClr>
+          </a:lnRef>
+          <a:fillRef idx="1">
+            <a:schemeClr val="accent1"/>
+          </a:fillRef>
+          <a:effectRef idx="0">
+            <a:schemeClr val="accent1"/>
+          </a:effectRef>
+          <a:fontRef idx="minor">
+            <a:schemeClr val="lt1"/>
+          </a:fontRef>
+        </p:style>
+        <p:txBody>
+          <a:bodyPr rtlCol="0" anchor="ctr"/>
+          <a:lstStyle/>
+          <a:p>
+            <a:pPr algn="ctr"/>
+            <a:r>
+              <a:rPr lang="pt-BR" dirty="0" err="1">
+                <a:latin typeface="Impact" panose="020B0806030902050204" pitchFamily="34" charset="0"/>
+              </a:rPr>
+              <a:t>Planner</a:t>
+            </a:r>
+            <a:endParaRPr lang="pt-BR" dirty="0">
+              <a:latin typeface="Impact" panose="020B0806030902050204" pitchFamily="34" charset="0"/>
+            </a:endParaRPr>
+          </a:p>
+        </p:txBody>
+      </p:sp>
+      <p:sp>
+        <p:nvSpPr>
+          <p:cNvPr id="13" name="Retângulo 12">
+            <a:extLst>
+              <a:ext uri="{FF2B5EF4-FFF2-40B4-BE49-F238E27FC236}">
+                <a16:creationId xmlns:a16="http://schemas.microsoft.com/office/drawing/2014/main" id="{3C474264-A873-1DE1-5512-9E8149D7C337}"/>
+              </a:ext>
+            </a:extLst>
+          </p:cNvPr>
+          <p:cNvSpPr/>
+          <p:nvPr/>
+        </p:nvSpPr>
+        <p:spPr>
+          <a:xfrm>
+            <a:off x="10074958" y="3104869"/>
+            <a:ext cx="1328379" cy="391540"/>
+          </a:xfrm>
+          <a:prstGeom prst="rect">
+            <a:avLst/>
+          </a:prstGeom>
+          <a:solidFill>
+            <a:srgbClr val="007DA9"/>
+          </a:solidFill>
+        </p:spPr>
+        <p:style>
+          <a:lnRef idx="2">
+            <a:schemeClr val="accent1">
+              <a:shade val="15000"/>
+            </a:schemeClr>
+          </a:lnRef>
+          <a:fillRef idx="1">
+            <a:schemeClr val="accent1"/>
+          </a:fillRef>
+          <a:effectRef idx="0">
+            <a:schemeClr val="accent1"/>
+          </a:effectRef>
+          <a:fontRef idx="minor">
+            <a:schemeClr val="lt1"/>
+          </a:fontRef>
+        </p:style>
+        <p:txBody>
+          <a:bodyPr rtlCol="0" anchor="ctr"/>
+          <a:lstStyle/>
+          <a:p>
+            <a:pPr algn="ctr"/>
+            <a:r>
+              <a:rPr lang="pt-BR" dirty="0">
+                <a:latin typeface="Impact" panose="020B0806030902050204" pitchFamily="34" charset="0"/>
+              </a:rPr>
+              <a:t>Executor</a:t>
+            </a:r>
+          </a:p>
+        </p:txBody>
+      </p:sp>
+      <p:sp>
+        <p:nvSpPr>
+          <p:cNvPr id="14" name="Retângulo 13">
+            <a:extLst>
+              <a:ext uri="{FF2B5EF4-FFF2-40B4-BE49-F238E27FC236}">
+                <a16:creationId xmlns:a16="http://schemas.microsoft.com/office/drawing/2014/main" id="{E103474C-3C0C-B26F-EC21-EC99FC259E15}"/>
+              </a:ext>
+            </a:extLst>
+          </p:cNvPr>
+          <p:cNvSpPr/>
+          <p:nvPr/>
+        </p:nvSpPr>
+        <p:spPr>
+          <a:xfrm>
+            <a:off x="10081478" y="3649483"/>
+            <a:ext cx="1328379" cy="590618"/>
+          </a:xfrm>
+          <a:prstGeom prst="rect">
+            <a:avLst/>
+          </a:prstGeom>
+          <a:solidFill>
+            <a:srgbClr val="007DA9"/>
+          </a:solidFill>
+        </p:spPr>
+        <p:style>
+          <a:lnRef idx="2">
+            <a:schemeClr val="accent1">
+              <a:shade val="15000"/>
+            </a:schemeClr>
+          </a:lnRef>
+          <a:fillRef idx="1">
+            <a:schemeClr val="accent1"/>
+          </a:fillRef>
+          <a:effectRef idx="0">
+            <a:schemeClr val="accent1"/>
+          </a:effectRef>
+          <a:fontRef idx="minor">
+            <a:schemeClr val="lt1"/>
+          </a:fontRef>
+        </p:style>
+        <p:txBody>
+          <a:bodyPr rtlCol="0" anchor="ctr"/>
+          <a:lstStyle/>
+          <a:p>
+            <a:pPr algn="ctr"/>
+            <a:r>
+              <a:rPr lang="pt-BR" dirty="0">
+                <a:latin typeface="Impact" panose="020B0806030902050204" pitchFamily="34" charset="0"/>
+              </a:rPr>
+              <a:t>Storage </a:t>
+            </a:r>
+            <a:r>
+              <a:rPr lang="pt-BR" dirty="0" err="1">
+                <a:latin typeface="Impact" panose="020B0806030902050204" pitchFamily="34" charset="0"/>
+              </a:rPr>
+              <a:t>Engine</a:t>
+            </a:r>
+            <a:endParaRPr lang="pt-BR" dirty="0">
+              <a:latin typeface="Impact" panose="020B0806030902050204" pitchFamily="34" charset="0"/>
+            </a:endParaRPr>
+          </a:p>
+        </p:txBody>
+      </p:sp>
+      <p:sp>
+        <p:nvSpPr>
+          <p:cNvPr id="16" name="Retângulo 15">
+            <a:extLst>
+              <a:ext uri="{FF2B5EF4-FFF2-40B4-BE49-F238E27FC236}">
+                <a16:creationId xmlns:a16="http://schemas.microsoft.com/office/drawing/2014/main" id="{1140BD1F-79DD-CFCB-7B35-F2E45051BE0B}"/>
+              </a:ext>
+            </a:extLst>
+          </p:cNvPr>
+          <p:cNvSpPr/>
+          <p:nvPr/>
+        </p:nvSpPr>
+        <p:spPr>
+          <a:xfrm>
+            <a:off x="10081478" y="4383939"/>
+            <a:ext cx="1328379" cy="590618"/>
+          </a:xfrm>
+          <a:prstGeom prst="rect">
+            <a:avLst/>
+          </a:prstGeom>
+          <a:solidFill>
+            <a:srgbClr val="007DA9"/>
+          </a:solidFill>
+        </p:spPr>
+        <p:style>
+          <a:lnRef idx="2">
+            <a:schemeClr val="accent1">
+              <a:shade val="15000"/>
+            </a:schemeClr>
+          </a:lnRef>
+          <a:fillRef idx="1">
+            <a:schemeClr val="accent1"/>
+          </a:fillRef>
+          <a:effectRef idx="0">
+            <a:schemeClr val="accent1"/>
+          </a:effectRef>
+          <a:fontRef idx="minor">
+            <a:schemeClr val="lt1"/>
+          </a:fontRef>
+        </p:style>
+        <p:txBody>
+          <a:bodyPr rtlCol="0" anchor="ctr"/>
+          <a:lstStyle/>
+          <a:p>
+            <a:pPr algn="ctr"/>
+            <a:r>
+              <a:rPr lang="pt-BR" dirty="0" err="1">
+                <a:latin typeface="Impact" panose="020B0806030902050204" pitchFamily="34" charset="0"/>
+              </a:rPr>
+              <a:t>Transaction</a:t>
+            </a:r>
+            <a:r>
+              <a:rPr lang="pt-BR" dirty="0">
+                <a:latin typeface="Impact" panose="020B0806030902050204" pitchFamily="34" charset="0"/>
+              </a:rPr>
+              <a:t> Manager</a:t>
+            </a:r>
+          </a:p>
+        </p:txBody>
+      </p:sp>
+      <p:sp>
+        <p:nvSpPr>
+          <p:cNvPr id="17" name="Retângulo 16">
+            <a:extLst>
+              <a:ext uri="{FF2B5EF4-FFF2-40B4-BE49-F238E27FC236}">
+                <a16:creationId xmlns:a16="http://schemas.microsoft.com/office/drawing/2014/main" id="{C3071C1D-9593-CFD0-FD0D-7852A591910A}"/>
+              </a:ext>
+            </a:extLst>
+          </p:cNvPr>
+          <p:cNvSpPr/>
+          <p:nvPr/>
+        </p:nvSpPr>
+        <p:spPr>
+          <a:xfrm>
+            <a:off x="10074957" y="5136562"/>
+            <a:ext cx="1328379" cy="391540"/>
+          </a:xfrm>
+          <a:prstGeom prst="rect">
+            <a:avLst/>
+          </a:prstGeom>
+          <a:solidFill>
+            <a:srgbClr val="007DA9"/>
+          </a:solidFill>
+        </p:spPr>
+        <p:style>
+          <a:lnRef idx="2">
+            <a:schemeClr val="accent1">
+              <a:shade val="15000"/>
+            </a:schemeClr>
+          </a:lnRef>
+          <a:fillRef idx="1">
+            <a:schemeClr val="accent1"/>
+          </a:fillRef>
+          <a:effectRef idx="0">
+            <a:schemeClr val="accent1"/>
+          </a:effectRef>
+          <a:fontRef idx="minor">
+            <a:schemeClr val="lt1"/>
+          </a:fontRef>
+        </p:style>
+        <p:txBody>
+          <a:bodyPr rtlCol="0" anchor="ctr"/>
+          <a:lstStyle/>
+          <a:p>
+            <a:pPr algn="ctr"/>
+            <a:r>
+              <a:rPr lang="pt-BR" dirty="0">
+                <a:latin typeface="Impact" panose="020B0806030902050204" pitchFamily="34" charset="0"/>
+              </a:rPr>
+              <a:t>Query </a:t>
+            </a:r>
+            <a:r>
+              <a:rPr lang="pt-BR" dirty="0" err="1">
+                <a:latin typeface="Impact" panose="020B0806030902050204" pitchFamily="34" charset="0"/>
+              </a:rPr>
+              <a:t>Cach</a:t>
+            </a:r>
+            <a:endParaRPr lang="pt-BR" dirty="0">
+              <a:latin typeface="Impact" panose="020B0806030902050204" pitchFamily="34" charset="0"/>
+            </a:endParaRPr>
+          </a:p>
+        </p:txBody>
+      </p:sp>
+      <p:sp>
+        <p:nvSpPr>
+          <p:cNvPr id="18" name="Retângulo 17">
+            <a:extLst>
+              <a:ext uri="{FF2B5EF4-FFF2-40B4-BE49-F238E27FC236}">
+                <a16:creationId xmlns:a16="http://schemas.microsoft.com/office/drawing/2014/main" id="{93BF9806-8CA9-E6F8-00A1-E2AFC40110A1}"/>
+              </a:ext>
+            </a:extLst>
+          </p:cNvPr>
+          <p:cNvSpPr/>
+          <p:nvPr/>
+        </p:nvSpPr>
+        <p:spPr>
+          <a:xfrm>
+            <a:off x="10074956" y="5694244"/>
+            <a:ext cx="1328379" cy="595720"/>
+          </a:xfrm>
+          <a:prstGeom prst="rect">
+            <a:avLst/>
+          </a:prstGeom>
+          <a:solidFill>
+            <a:srgbClr val="007DA9"/>
+          </a:solidFill>
+        </p:spPr>
+        <p:style>
+          <a:lnRef idx="2">
+            <a:schemeClr val="accent1">
+              <a:shade val="15000"/>
+            </a:schemeClr>
+          </a:lnRef>
+          <a:fillRef idx="1">
+            <a:schemeClr val="accent1"/>
+          </a:fillRef>
+          <a:effectRef idx="0">
+            <a:schemeClr val="accent1"/>
+          </a:effectRef>
+          <a:fontRef idx="minor">
+            <a:schemeClr val="lt1"/>
+          </a:fontRef>
+        </p:style>
+        <p:txBody>
+          <a:bodyPr rtlCol="0" anchor="ctr"/>
+          <a:lstStyle/>
+          <a:p>
+            <a:pPr algn="ctr"/>
+            <a:r>
+              <a:rPr lang="pt-BR" dirty="0">
+                <a:latin typeface="Impact" panose="020B0806030902050204" pitchFamily="34" charset="0"/>
+              </a:rPr>
+              <a:t>Output Module</a:t>
+            </a:r>
+          </a:p>
+        </p:txBody>
+      </p:sp>
+    </p:spTree>
+    <p:extLst>
+      <p:ext uri="{BB962C8B-B14F-4D97-AF65-F5344CB8AC3E}">
+        <p14:creationId xmlns:p14="http://schemas.microsoft.com/office/powerpoint/2010/main" val="1732486208"/>
+      </p:ext>
+    </p:extLst>
+  </p:cSld>
+  <p:clrMapOvr>
+    <a:masterClrMapping/>
+  </p:clrMapOvr>
+  <p:timing>
+    <p:tnLst>
+      <p:par>
+        <p:cTn id="1" dur="indefinite" restart="never" nodeType="tmRoot">
+          <p:childTnLst>
+            <p:seq concurrent="1" nextAc="seek">
+              <p:cTn id="2" dur="indefinite" nodeType="mainSeq">
+                <p:childTnLst>
+                  <p:par>
+                    <p:cTn id="3" fill="hold">
+                      <p:stCondLst>
+                        <p:cond delay="indefinite"/>
+                      </p:stCondLst>
+                      <p:childTnLst>
+                        <p:par>
+                          <p:cTn id="4" fill="hold">
+                            <p:stCondLst>
+                              <p:cond delay="0"/>
+                            </p:stCondLst>
+                            <p:childTnLst>
+                              <p:par>
+                                <p:cTn id="5" presetID="1" presetClass="entr" presetSubtype="0" fill="hold" grpId="0" nodeType="clickEffect">
+                                  <p:stCondLst>
+                                    <p:cond delay="0"/>
+                                  </p:stCondLst>
+                                  <p:childTnLst>
+                                    <p:set>
+                                      <p:cBhvr>
+                                        <p:cTn id="6" dur="1" fill="hold">
+                                          <p:stCondLst>
+                                            <p:cond delay="0"/>
+                                          </p:stCondLst>
+                                        </p:cTn>
+                                        <p:tgtEl>
+                                          <p:spTgt spid="10"/>
+                                        </p:tgtEl>
+                                        <p:attrNameLst>
+                                          <p:attrName>style.visibility</p:attrName>
+                                        </p:attrNameLst>
+                                      </p:cBhvr>
+                                      <p:to>
+                                        <p:strVal val="visible"/>
+                                      </p:to>
+                                    </p:set>
+                                  </p:childTnLst>
+                                </p:cTn>
+                              </p:par>
+                            </p:childTnLst>
+                          </p:cTn>
+                        </p:par>
+                      </p:childTnLst>
+                    </p:cTn>
+                  </p:par>
+                  <p:par>
+                    <p:cTn id="7" fill="hold">
+                      <p:stCondLst>
+                        <p:cond delay="indefinite"/>
+                      </p:stCondLst>
+                      <p:childTnLst>
+                        <p:par>
+                          <p:cTn id="8" fill="hold">
+                            <p:stCondLst>
+                              <p:cond delay="0"/>
+                            </p:stCondLst>
+                            <p:childTnLst>
+                              <p:par>
+                                <p:cTn id="9" presetID="1" presetClass="entr" presetSubtype="0" fill="hold" grpId="0" nodeType="clickEffect">
+                                  <p:stCondLst>
+                                    <p:cond delay="0"/>
+                                  </p:stCondLst>
+                                  <p:childTnLst>
+                                    <p:set>
+                                      <p:cBhvr>
+                                        <p:cTn id="10" dur="1" fill="hold">
+                                          <p:stCondLst>
+                                            <p:cond delay="0"/>
+                                          </p:stCondLst>
+                                        </p:cTn>
+                                        <p:tgtEl>
+                                          <p:spTgt spid="11"/>
+                                        </p:tgtEl>
+                                        <p:attrNameLst>
+                                          <p:attrName>style.visibility</p:attrName>
+                                        </p:attrNameLst>
+                                      </p:cBhvr>
+                                      <p:to>
+                                        <p:strVal val="visible"/>
+                                      </p:to>
+                                    </p:set>
+                                  </p:childTnLst>
+                                </p:cTn>
+                              </p:par>
+                              <p:par>
+                                <p:cTn id="11" presetID="1" presetClass="entr" presetSubtype="0" fill="hold" grpId="0" nodeType="withEffect">
+                                  <p:stCondLst>
+                                    <p:cond delay="0"/>
+                                  </p:stCondLst>
+                                  <p:childTnLst>
+                                    <p:set>
+                                      <p:cBhvr>
+                                        <p:cTn id="12" dur="1" fill="hold">
+                                          <p:stCondLst>
+                                            <p:cond delay="0"/>
+                                          </p:stCondLst>
+                                        </p:cTn>
+                                        <p:tgtEl>
+                                          <p:spTgt spid="12"/>
+                                        </p:tgtEl>
+                                        <p:attrNameLst>
+                                          <p:attrName>style.visibility</p:attrName>
+                                        </p:attrNameLst>
+                                      </p:cBhvr>
+                                      <p:to>
+                                        <p:strVal val="visible"/>
+                                      </p:to>
+                                    </p:set>
+                                  </p:childTnLst>
+                                </p:cTn>
+                              </p:par>
+                              <p:par>
+                                <p:cTn id="13" presetID="1" presetClass="entr" presetSubtype="0" fill="hold" grpId="0" nodeType="withEffect">
+                                  <p:stCondLst>
+                                    <p:cond delay="0"/>
+                                  </p:stCondLst>
+                                  <p:childTnLst>
+                                    <p:set>
+                                      <p:cBhvr>
+                                        <p:cTn id="14" dur="1" fill="hold">
+                                          <p:stCondLst>
+                                            <p:cond delay="0"/>
+                                          </p:stCondLst>
+                                        </p:cTn>
+                                        <p:tgtEl>
+                                          <p:spTgt spid="13"/>
+                                        </p:tgtEl>
+                                        <p:attrNameLst>
+                                          <p:attrName>style.visibility</p:attrName>
+                                        </p:attrNameLst>
+                                      </p:cBhvr>
+                                      <p:to>
+                                        <p:strVal val="visible"/>
+                                      </p:to>
+                                    </p:set>
+                                  </p:childTnLst>
+                                </p:cTn>
+                              </p:par>
+                            </p:childTnLst>
+                          </p:cTn>
+                        </p:par>
+                      </p:childTnLst>
+                    </p:cTn>
+                  </p:par>
+                  <p:par>
+                    <p:cTn id="15" fill="hold">
+                      <p:stCondLst>
+                        <p:cond delay="indefinite"/>
+                      </p:stCondLst>
+                      <p:childTnLst>
+                        <p:par>
+                          <p:cTn id="16" fill="hold">
+                            <p:stCondLst>
+                              <p:cond delay="0"/>
+                            </p:stCondLst>
+                            <p:childTnLst>
+                              <p:par>
+                                <p:cTn id="17" presetID="1" presetClass="entr" presetSubtype="0" fill="hold" grpId="0" nodeType="clickEffect">
+                                  <p:stCondLst>
+                                    <p:cond delay="0"/>
+                                  </p:stCondLst>
+                                  <p:childTnLst>
+                                    <p:set>
+                                      <p:cBhvr>
+                                        <p:cTn id="18" dur="1" fill="hold">
+                                          <p:stCondLst>
+                                            <p:cond delay="0"/>
+                                          </p:stCondLst>
+                                        </p:cTn>
+                                        <p:tgtEl>
+                                          <p:spTgt spid="14"/>
+                                        </p:tgtEl>
+                                        <p:attrNameLst>
+                                          <p:attrName>style.visibility</p:attrName>
+                                        </p:attrNameLst>
+                                      </p:cBhvr>
+                                      <p:to>
+                                        <p:strVal val="visible"/>
+                                      </p:to>
+                                    </p:set>
+                                  </p:childTnLst>
+                                </p:cTn>
+                              </p:par>
+                            </p:childTnLst>
+                          </p:cTn>
+                        </p:par>
+                      </p:childTnLst>
+                    </p:cTn>
+                  </p:par>
+                  <p:par>
+                    <p:cTn id="19" fill="hold">
+                      <p:stCondLst>
+                        <p:cond delay="indefinite"/>
+                      </p:stCondLst>
+                      <p:childTnLst>
+                        <p:par>
+                          <p:cTn id="20" fill="hold">
+                            <p:stCondLst>
+                              <p:cond delay="0"/>
+                            </p:stCondLst>
+                            <p:childTnLst>
+                              <p:par>
+                                <p:cTn id="21" presetID="1" presetClass="entr" presetSubtype="0" fill="hold" grpId="0" nodeType="clickEffect">
+                                  <p:stCondLst>
+                                    <p:cond delay="0"/>
+                                  </p:stCondLst>
+                                  <p:childTnLst>
+                                    <p:set>
+                                      <p:cBhvr>
+                                        <p:cTn id="22" dur="1" fill="hold">
+                                          <p:stCondLst>
+                                            <p:cond delay="0"/>
+                                          </p:stCondLst>
+                                        </p:cTn>
+                                        <p:tgtEl>
+                                          <p:spTgt spid="16"/>
+                                        </p:tgtEl>
+                                        <p:attrNameLst>
+                                          <p:attrName>style.visibility</p:attrName>
+                                        </p:attrNameLst>
+                                      </p:cBhvr>
+                                      <p:to>
+                                        <p:strVal val="visible"/>
+                                      </p:to>
+                                    </p:set>
+                                  </p:childTnLst>
+                                </p:cTn>
+                              </p:par>
+                            </p:childTnLst>
+                          </p:cTn>
+                        </p:par>
+                      </p:childTnLst>
+                    </p:cTn>
+                  </p:par>
+                  <p:par>
+                    <p:cTn id="23" fill="hold">
+                      <p:stCondLst>
+                        <p:cond delay="indefinite"/>
+                      </p:stCondLst>
+                      <p:childTnLst>
+                        <p:par>
+                          <p:cTn id="24" fill="hold">
+                            <p:stCondLst>
+                              <p:cond delay="0"/>
+                            </p:stCondLst>
+                            <p:childTnLst>
+                              <p:par>
+                                <p:cTn id="25" presetID="1" presetClass="entr" presetSubtype="0" fill="hold" grpId="0" nodeType="clickEffect">
+                                  <p:stCondLst>
+                                    <p:cond delay="0"/>
+                                  </p:stCondLst>
+                                  <p:childTnLst>
+                                    <p:set>
+                                      <p:cBhvr>
+                                        <p:cTn id="26" dur="1" fill="hold">
+                                          <p:stCondLst>
+                                            <p:cond delay="0"/>
+                                          </p:stCondLst>
+                                        </p:cTn>
+                                        <p:tgtEl>
+                                          <p:spTgt spid="17"/>
+                                        </p:tgtEl>
+                                        <p:attrNameLst>
+                                          <p:attrName>style.visibility</p:attrName>
+                                        </p:attrNameLst>
+                                      </p:cBhvr>
+                                      <p:to>
+                                        <p:strVal val="visible"/>
+                                      </p:to>
+                                    </p:set>
+                                  </p:childTnLst>
+                                </p:cTn>
+                              </p:par>
+                            </p:childTnLst>
+                          </p:cTn>
+                        </p:par>
+                      </p:childTnLst>
+                    </p:cTn>
+                  </p:par>
+                  <p:par>
+                    <p:cTn id="27" fill="hold">
+                      <p:stCondLst>
+                        <p:cond delay="indefinite"/>
+                      </p:stCondLst>
+                      <p:childTnLst>
+                        <p:par>
+                          <p:cTn id="28" fill="hold">
+                            <p:stCondLst>
+                              <p:cond delay="0"/>
+                            </p:stCondLst>
+                            <p:childTnLst>
+                              <p:par>
+                                <p:cTn id="29" presetID="1" presetClass="entr" presetSubtype="0" fill="hold" grpId="0" nodeType="clickEffect">
+                                  <p:stCondLst>
+                                    <p:cond delay="0"/>
+                                  </p:stCondLst>
+                                  <p:childTnLst>
+                                    <p:set>
+                                      <p:cBhvr>
+                                        <p:cTn id="30" dur="1" fill="hold">
+                                          <p:stCondLst>
+                                            <p:cond delay="0"/>
+                                          </p:stCondLst>
+                                        </p:cTn>
+                                        <p:tgtEl>
+                                          <p:spTgt spid="18"/>
+                                        </p:tgtEl>
+                                        <p:attrNameLst>
+                                          <p:attrName>style.visibility</p:attrName>
+                                        </p:attrNameLst>
+                                      </p:cBhvr>
+                                      <p:to>
+                                        <p:strVal val="visible"/>
+                                      </p:to>
+                                    </p:set>
+                                  </p:childTnLst>
+                                </p:cTn>
+                              </p:par>
+                            </p:childTnLst>
+                          </p:cTn>
+                        </p:par>
+                      </p:childTnLst>
+                    </p:cTn>
+                  </p:par>
+                </p:childTnLst>
+              </p:cTn>
+              <p:prevCondLst>
+                <p:cond evt="onPrev" delay="0">
+                  <p:tgtEl>
+                    <p:sldTgt/>
+                  </p:tgtEl>
+                </p:cond>
+              </p:prevCondLst>
+              <p:nextCondLst>
+                <p:cond evt="onNext" delay="0">
+                  <p:tgtEl>
+                    <p:sldTgt/>
+                  </p:tgtEl>
+                </p:cond>
+              </p:nextCondLst>
+            </p:seq>
+          </p:childTnLst>
+        </p:cTn>
+      </p:par>
+    </p:tnLst>
+    <p:bldLst>
+      <p:bldP spid="10" grpId="0" animBg="1"/>
+      <p:bldP spid="11" grpId="0" animBg="1"/>
+      <p:bldP spid="12" grpId="0" animBg="1"/>
+      <p:bldP spid="13" grpId="0" animBg="1"/>
+      <p:bldP spid="14" grpId="0" animBg="1"/>
+      <p:bldP spid="16" grpId="0" animBg="1"/>
+      <p:bldP spid="17" grpId="0" animBg="1"/>
+      <p:bldP spid="18" grpId="0" animBg="1"/>
+    </p:bldLst>
+  </p:timing>
 </p:sld>
 </file>
 

</xml_diff>